<commit_message>
Alterado os slides referentes ao sprint do Joshua e do Francis
</commit_message>
<xml_diff>
--- a/Sprints/Sprint_001 da equipe.pptx
+++ b/Sprints/Sprint_001 da equipe.pptx
@@ -354,7 +354,7 @@
             <a:fld id="{5586B75A-687E-405C-8A0B-8D00578BA2C3}" type="datetimeFigureOut">
               <a:rPr lang="en-US" dirty="0"/>
               <a:pPr/>
-              <a:t>9/9/2018</a:t>
+              <a:t>9/10/2018</a:t>
             </a:fld>
             <a:endParaRPr lang="en-US" dirty="0"/>
           </a:p>
@@ -521,7 +521,7 @@
             <a:fld id="{5586B75A-687E-405C-8A0B-8D00578BA2C3}" type="datetimeFigureOut">
               <a:rPr lang="en-US" dirty="0"/>
               <a:pPr/>
-              <a:t>9/9/2018</a:t>
+              <a:t>9/10/2018</a:t>
             </a:fld>
             <a:endParaRPr lang="en-US" dirty="0"/>
           </a:p>
@@ -698,7 +698,7 @@
             <a:fld id="{5586B75A-687E-405C-8A0B-8D00578BA2C3}" type="datetimeFigureOut">
               <a:rPr lang="en-US" dirty="0"/>
               <a:pPr/>
-              <a:t>9/9/2018</a:t>
+              <a:t>9/10/2018</a:t>
             </a:fld>
             <a:endParaRPr lang="en-US" dirty="0"/>
           </a:p>
@@ -865,7 +865,7 @@
             <a:fld id="{5586B75A-687E-405C-8A0B-8D00578BA2C3}" type="datetimeFigureOut">
               <a:rPr lang="en-US" dirty="0"/>
               <a:pPr/>
-              <a:t>9/9/2018</a:t>
+              <a:t>9/10/2018</a:t>
             </a:fld>
             <a:endParaRPr lang="en-US" dirty="0"/>
           </a:p>
@@ -1120,7 +1120,7 @@
             <a:fld id="{5586B75A-687E-405C-8A0B-8D00578BA2C3}" type="datetimeFigureOut">
               <a:rPr lang="en-US" dirty="0"/>
               <a:pPr/>
-              <a:t>9/9/2018</a:t>
+              <a:t>9/10/2018</a:t>
             </a:fld>
             <a:endParaRPr lang="en-US" dirty="0"/>
           </a:p>
@@ -1405,7 +1405,7 @@
             <a:fld id="{5586B75A-687E-405C-8A0B-8D00578BA2C3}" type="datetimeFigureOut">
               <a:rPr lang="en-US" dirty="0"/>
               <a:pPr/>
-              <a:t>9/9/2018</a:t>
+              <a:t>9/10/2018</a:t>
             </a:fld>
             <a:endParaRPr lang="en-US" dirty="0"/>
           </a:p>
@@ -1844,7 +1844,7 @@
             <a:fld id="{5586B75A-687E-405C-8A0B-8D00578BA2C3}" type="datetimeFigureOut">
               <a:rPr lang="en-US" dirty="0"/>
               <a:pPr/>
-              <a:t>9/9/2018</a:t>
+              <a:t>9/10/2018</a:t>
             </a:fld>
             <a:endParaRPr lang="en-US" dirty="0"/>
           </a:p>
@@ -1959,7 +1959,7 @@
             <a:fld id="{5586B75A-687E-405C-8A0B-8D00578BA2C3}" type="datetimeFigureOut">
               <a:rPr lang="en-US" dirty="0"/>
               <a:pPr/>
-              <a:t>9/9/2018</a:t>
+              <a:t>9/10/2018</a:t>
             </a:fld>
             <a:endParaRPr lang="en-US" dirty="0"/>
           </a:p>
@@ -2051,7 +2051,7 @@
             <a:fld id="{5586B75A-687E-405C-8A0B-8D00578BA2C3}" type="datetimeFigureOut">
               <a:rPr lang="en-US" dirty="0"/>
               <a:pPr/>
-              <a:t>9/9/2018</a:t>
+              <a:t>9/10/2018</a:t>
             </a:fld>
             <a:endParaRPr lang="en-US" dirty="0"/>
           </a:p>
@@ -2336,7 +2336,7 @@
             <a:fld id="{5586B75A-687E-405C-8A0B-8D00578BA2C3}" type="datetimeFigureOut">
               <a:rPr lang="en-US" dirty="0"/>
               <a:pPr/>
-              <a:t>9/9/2018</a:t>
+              <a:t>9/10/2018</a:t>
             </a:fld>
             <a:endParaRPr lang="en-US" dirty="0"/>
           </a:p>
@@ -2606,7 +2606,7 @@
             <a:fld id="{5586B75A-687E-405C-8A0B-8D00578BA2C3}" type="datetimeFigureOut">
               <a:rPr lang="en-US" dirty="0"/>
               <a:pPr/>
-              <a:t>9/9/2018</a:t>
+              <a:t>9/10/2018</a:t>
             </a:fld>
             <a:endParaRPr lang="en-US" dirty="0"/>
           </a:p>
@@ -2900,7 +2900,7 @@
             <a:fld id="{5586B75A-687E-405C-8A0B-8D00578BA2C3}" type="datetimeFigureOut">
               <a:rPr lang="en-US" dirty="0"/>
               <a:pPr/>
-              <a:t>9/9/2018</a:t>
+              <a:t>9/10/2018</a:t>
             </a:fld>
             <a:endParaRPr lang="en-US" dirty="0"/>
           </a:p>
@@ -4001,8 +4001,8 @@
               <a:t>1ª Estória: </a:t>
             </a:r>
             <a:r>
-              <a:rPr lang="pt-BR" dirty="0"/>
-              <a:t>Reunião com a Fulana para acompanhamento de atividades relativas ao desenvolvimento da Ontologia.</a:t>
+              <a:rPr lang="pt-BR" dirty="0" smtClean="0"/>
+              <a:t>Implementação das superclasses.</a:t>
             </a:r>
             <a:endParaRPr lang="pt-BR" sz="1400" dirty="0">
               <a:latin typeface="Calibri" panose="020F0502020204030204" pitchFamily="34" charset="0"/>
@@ -4018,16 +4018,13 @@
             </a:r>
             <a:r>
               <a:rPr lang="pt-BR" dirty="0"/>
-              <a:t>:  Como aluno, preciso me reunir com a Fulana, a fim de organizar as etapas que ainda faltam para o desenvolvimento da </a:t>
-            </a:r>
-            <a:r>
-              <a:rPr lang="pt-BR" dirty="0" err="1"/>
-              <a:t>ontoCED</a:t>
-            </a:r>
-            <a:r>
-              <a:rPr lang="pt-BR" dirty="0"/>
-              <a:t>.</a:t>
-            </a:r>
+              <a:t>: </a:t>
+            </a:r>
+            <a:r>
+              <a:rPr lang="pt-BR" dirty="0" smtClean="0"/>
+              <a:t>Iniciar a implementação/codificação da superclasse principal do projeto.</a:t>
+            </a:r>
+            <a:endParaRPr lang="pt-BR" dirty="0"/>
           </a:p>
           <a:p>
             <a:r>
@@ -4035,17 +4032,22 @@
               <a:t>Critério: </a:t>
             </a:r>
             <a:r>
-              <a:rPr lang="pt-BR" dirty="0"/>
-              <a:t>Reuniões realizadas</a:t>
-            </a:r>
-            <a:r>
-              <a:rPr lang="pt-BR" dirty="0">
+              <a:rPr lang="pt-BR" dirty="0" smtClean="0"/>
+              <a:t>Diagrama de Classe</a:t>
+            </a:r>
+            <a:r>
+              <a:rPr lang="pt-BR" dirty="0" smtClean="0">
                 <a:latin typeface="Calibri" panose="020F0502020204030204" pitchFamily="34" charset="0"/>
                 <a:ea typeface="Calibri" panose="020F0502020204030204" pitchFamily="34" charset="0"/>
                 <a:cs typeface="Times New Roman" panose="02020603050405020304" pitchFamily="18" charset="0"/>
               </a:rPr>
               <a:t>.</a:t>
             </a:r>
+            <a:endParaRPr lang="pt-BR" dirty="0">
+              <a:latin typeface="Calibri" panose="020F0502020204030204" pitchFamily="34" charset="0"/>
+              <a:ea typeface="Calibri" panose="020F0502020204030204" pitchFamily="34" charset="0"/>
+              <a:cs typeface="Times New Roman" panose="02020603050405020304" pitchFamily="18" charset="0"/>
+            </a:endParaRPr>
           </a:p>
         </p:txBody>
       </p:sp>
@@ -4139,9 +4141,10 @@
               <a:t>2ª Estória: </a:t>
             </a:r>
             <a:r>
-              <a:rPr lang="pt-BR" dirty="0"/>
-              <a:t>Cria a versão parcial da ontologia que será usada no projeto.</a:t>
-            </a:r>
+              <a:rPr lang="pt-BR" dirty="0" smtClean="0"/>
+              <a:t>Pesquisar a implementação do Banco de Dados e da Interface Gráfica.</a:t>
+            </a:r>
+            <a:endParaRPr lang="pt-BR" dirty="0"/>
           </a:p>
           <a:p>
             <a:pPr algn="just"/>
@@ -4151,27 +4154,36 @@
             </a:r>
             <a:r>
               <a:rPr lang="pt-BR" dirty="0"/>
-              <a:t>:   Como pesquisador, após terminar a ontologia parcial , preciso revisar para que fique nos padrões .</a:t>
+              <a:t>:   </a:t>
+            </a:r>
+            <a:r>
+              <a:rPr lang="pt-BR" dirty="0" smtClean="0"/>
+              <a:t>Entender como implementar um Banco de Dados e como juntar a interface aos scripts.</a:t>
             </a:r>
           </a:p>
           <a:p>
             <a:pPr algn="just"/>
             <a:r>
+              <a:rPr lang="pt-BR" b="1" dirty="0" smtClean="0"/>
+              <a:t>Status</a:t>
+            </a:r>
+            <a:r>
               <a:rPr lang="pt-BR" b="1" dirty="0"/>
-              <a:t>Status: [</a:t>
-            </a:r>
-            <a:r>
-              <a:rPr lang="pt-BR" dirty="0"/>
-              <a:t>Entregar a ontologia</a:t>
-            </a:r>
-            <a:r>
-              <a:rPr lang="pt-BR" b="1" dirty="0"/>
+              <a:t>: [</a:t>
+            </a:r>
+            <a:r>
+              <a:rPr lang="pt-BR" smtClean="0"/>
+              <a:t>Em andamento</a:t>
+            </a:r>
+            <a:r>
+              <a:rPr lang="pt-BR" b="1" smtClean="0"/>
               <a:t>]</a:t>
             </a:r>
             <a:r>
-              <a:rPr lang="pt-BR" dirty="0"/>
+              <a:rPr lang="pt-BR" smtClean="0"/>
               <a:t>.</a:t>
             </a:r>
+            <a:endParaRPr lang="pt-BR" dirty="0"/>
           </a:p>
         </p:txBody>
       </p:sp>

</xml_diff>